<commit_message>
various improvements as part of work on pygments lexer
</commit_message>
<xml_diff>
--- a/assets/introducing-intent.pptx
+++ b/assets/introducing-intent.pptx
@@ -380,7 +380,7 @@
           <a:p>
             <a:fld id="{6BFECD78-3C8E-49F2-8FAB-59489D168ABB}" type="datetimeFigureOut">
               <a:rPr lang="en-US" smtClean="0"/>
-              <a:t>2/9/14</a:t>
+              <a:t>2/14/14</a:t>
             </a:fld>
             <a:endParaRPr lang="en-US"/>
           </a:p>
@@ -635,7 +635,7 @@
           <a:p>
             <a:fld id="{6BFECD78-3C8E-49F2-8FAB-59489D168ABB}" type="datetimeFigureOut">
               <a:rPr lang="en-US" smtClean="0"/>
-              <a:t>2/9/14</a:t>
+              <a:t>2/14/14</a:t>
             </a:fld>
             <a:endParaRPr lang="en-US"/>
           </a:p>
@@ -846,7 +846,7 @@
           <a:p>
             <a:fld id="{6BFECD78-3C8E-49F2-8FAB-59489D168ABB}" type="datetimeFigureOut">
               <a:rPr lang="en-US" smtClean="0"/>
-              <a:t>2/9/14</a:t>
+              <a:t>2/14/14</a:t>
             </a:fld>
             <a:endParaRPr lang="en-US"/>
           </a:p>
@@ -1473,7 +1473,7 @@
           <a:p>
             <a:fld id="{6BFECD78-3C8E-49F2-8FAB-59489D168ABB}" type="datetimeFigureOut">
               <a:rPr lang="en-US" smtClean="0"/>
-              <a:t>2/9/14</a:t>
+              <a:t>2/14/14</a:t>
             </a:fld>
             <a:endParaRPr lang="en-US"/>
           </a:p>
@@ -1774,7 +1774,7 @@
           <a:p>
             <a:fld id="{6BFECD78-3C8E-49F2-8FAB-59489D168ABB}" type="datetimeFigureOut">
               <a:rPr lang="en-US" smtClean="0"/>
-              <a:t>2/9/14</a:t>
+              <a:t>2/14/14</a:t>
             </a:fld>
             <a:endParaRPr lang="en-US"/>
           </a:p>
@@ -2177,7 +2177,7 @@
           <a:p>
             <a:fld id="{6BFECD78-3C8E-49F2-8FAB-59489D168ABB}" type="datetimeFigureOut">
               <a:rPr lang="en-US" smtClean="0"/>
-              <a:t>2/9/14</a:t>
+              <a:t>2/14/14</a:t>
             </a:fld>
             <a:endParaRPr lang="en-US"/>
           </a:p>
@@ -2685,7 +2685,7 @@
           <a:p>
             <a:fld id="{6BFECD78-3C8E-49F2-8FAB-59489D168ABB}" type="datetimeFigureOut">
               <a:rPr lang="en-US" smtClean="0"/>
-              <a:t>2/9/14</a:t>
+              <a:t>2/14/14</a:t>
             </a:fld>
             <a:endParaRPr lang="en-US"/>
           </a:p>
@@ -2858,7 +2858,7 @@
           <a:p>
             <a:fld id="{6BFECD78-3C8E-49F2-8FAB-59489D168ABB}" type="datetimeFigureOut">
               <a:rPr lang="en-US" smtClean="0"/>
-              <a:t>2/9/14</a:t>
+              <a:t>2/14/14</a:t>
             </a:fld>
             <a:endParaRPr lang="en-US"/>
           </a:p>
@@ -3038,7 +3038,7 @@
           <a:p>
             <a:fld id="{6BFECD78-3C8E-49F2-8FAB-59489D168ABB}" type="datetimeFigureOut">
               <a:rPr lang="en-US" smtClean="0"/>
-              <a:t>2/9/14</a:t>
+              <a:t>2/14/14</a:t>
             </a:fld>
             <a:endParaRPr lang="en-US"/>
           </a:p>
@@ -3346,7 +3346,7 @@
           <a:p>
             <a:fld id="{6BFECD78-3C8E-49F2-8FAB-59489D168ABB}" type="datetimeFigureOut">
               <a:rPr lang="en-US" smtClean="0"/>
-              <a:t>2/9/14</a:t>
+              <a:t>2/14/14</a:t>
             </a:fld>
             <a:endParaRPr lang="en-US"/>
           </a:p>
@@ -3600,7 +3600,7 @@
           <a:p>
             <a:fld id="{6BFECD78-3C8E-49F2-8FAB-59489D168ABB}" type="datetimeFigureOut">
               <a:rPr lang="en-US" smtClean="0"/>
-              <a:t>2/9/14</a:t>
+              <a:t>2/14/14</a:t>
             </a:fld>
             <a:endParaRPr lang="en-US"/>
           </a:p>
@@ -3898,7 +3898,7 @@
           <a:p>
             <a:fld id="{7BA99288-2384-C64C-992A-406B1D78017E}" type="datetimeFigureOut">
               <a:rPr lang="en-US" smtClean="0"/>
-              <a:t>2/9/14</a:t>
+              <a:t>2/14/14</a:t>
             </a:fld>
             <a:endParaRPr lang="en-US"/>
           </a:p>
@@ -9073,7 +9073,7 @@
               <a:buNone/>
             </a:pPr>
             <a:r>
-              <a:rPr lang="en-US" sz="2400"/>
+              <a:rPr lang="en-US" sz="2400" dirty="0"/>
               <a:t>	</a:t>
             </a:r>
             <a:endParaRPr lang="en-US" sz="2400" dirty="0" smtClean="0"/>
@@ -10853,7 +10853,11 @@
             </a:pPr>
             <a:r>
               <a:rPr lang="en-US" dirty="0" smtClean="0"/>
-              <a:t>…which focuses on people and their why’s.</a:t>
+              <a:t>…that </a:t>
+            </a:r>
+            <a:r>
+              <a:rPr lang="en-US" dirty="0" smtClean="0"/>
+              <a:t>focuses on people and their why’s.</a:t>
             </a:r>
           </a:p>
         </p:txBody>

</xml_diff>